<commit_message>
pusblished the latest TNC_ResNet18_ImageNet_CNTK.model
</commit_message>
<xml_diff>
--- a/Document/CNTK_Project_Status_20180708.pptx
+++ b/Document/CNTK_Project_Status_20180708.pptx
@@ -5,7 +5,7 @@
     <p:sldMasterId id="2147483648" r:id="rId1"/>
   </p:sldMasterIdLst>
   <p:notesMasterIdLst>
-    <p:notesMasterId r:id="rId24"/>
+    <p:notesMasterId r:id="rId23"/>
   </p:notesMasterIdLst>
   <p:sldIdLst>
     <p:sldId id="256" r:id="rId2"/>
@@ -28,8 +28,7 @@
     <p:sldId id="285" r:id="rId19"/>
     <p:sldId id="291" r:id="rId20"/>
     <p:sldId id="292" r:id="rId21"/>
-    <p:sldId id="293" r:id="rId22"/>
-    <p:sldId id="294" r:id="rId23"/>
+    <p:sldId id="294" r:id="rId22"/>
   </p:sldIdLst>
   <p:sldSz cx="12192000" cy="6858000"/>
   <p:notesSz cx="6858000" cy="9144000"/>
@@ -218,7 +217,7 @@
           <a:p>
             <a:fld id="{0B2598F9-4ADA-4B51-B6CC-F76EAD98554E}" type="datetimeFigureOut">
               <a:rPr lang="en-US" smtClean="0"/>
-              <a:t>7/8/2018</a:t>
+              <a:t>7/9/2018</a:t>
             </a:fld>
             <a:endParaRPr lang="en-US"/>
           </a:p>
@@ -1651,90 +1650,6 @@
     </p:spTree>
     <p:extLst>
       <p:ext uri="{BB962C8B-B14F-4D97-AF65-F5344CB8AC3E}">
-        <p14:creationId xmlns:p14="http://schemas.microsoft.com/office/powerpoint/2010/main" val="1103465974"/>
-      </p:ext>
-    </p:extLst>
-  </p:cSld>
-  <p:clrMapOvr>
-    <a:masterClrMapping/>
-  </p:clrMapOvr>
-</p:notes>
-</file>
-
-<file path=ppt/notesSlides/notesSlide22.xml><?xml version="1.0" encoding="utf-8"?>
-<p:notes xmlns:a="http://schemas.openxmlformats.org/drawingml/2006/main" xmlns:r="http://schemas.openxmlformats.org/officeDocument/2006/relationships" xmlns:p="http://schemas.openxmlformats.org/presentationml/2006/main">
-  <p:cSld>
-    <p:spTree>
-      <p:nvGrpSpPr>
-        <p:cNvPr id="1" name=""/>
-        <p:cNvGrpSpPr/>
-        <p:nvPr/>
-      </p:nvGrpSpPr>
-      <p:grpSpPr>
-        <a:xfrm>
-          <a:off x="0" y="0"/>
-          <a:ext cx="0" cy="0"/>
-          <a:chOff x="0" y="0"/>
-          <a:chExt cx="0" cy="0"/>
-        </a:xfrm>
-      </p:grpSpPr>
-      <p:sp>
-        <p:nvSpPr>
-          <p:cNvPr id="2" name="Slide Image Placeholder 1"/>
-          <p:cNvSpPr>
-            <a:spLocks noGrp="1" noRot="1" noChangeAspect="1"/>
-          </p:cNvSpPr>
-          <p:nvPr>
-            <p:ph type="sldImg"/>
-          </p:nvPr>
-        </p:nvSpPr>
-        <p:spPr/>
-      </p:sp>
-      <p:sp>
-        <p:nvSpPr>
-          <p:cNvPr id="3" name="Notes Placeholder 2"/>
-          <p:cNvSpPr>
-            <a:spLocks noGrp="1"/>
-          </p:cNvSpPr>
-          <p:nvPr>
-            <p:ph type="body" idx="1"/>
-          </p:nvPr>
-        </p:nvSpPr>
-        <p:spPr/>
-        <p:txBody>
-          <a:bodyPr/>
-          <a:lstStyle/>
-          <a:p>
-            <a:endParaRPr lang="en-US"/>
-          </a:p>
-        </p:txBody>
-      </p:sp>
-      <p:sp>
-        <p:nvSpPr>
-          <p:cNvPr id="4" name="Slide Number Placeholder 3"/>
-          <p:cNvSpPr>
-            <a:spLocks noGrp="1"/>
-          </p:cNvSpPr>
-          <p:nvPr>
-            <p:ph type="sldNum" sz="quarter" idx="10"/>
-          </p:nvPr>
-        </p:nvSpPr>
-        <p:spPr/>
-        <p:txBody>
-          <a:bodyPr/>
-          <a:lstStyle/>
-          <a:p>
-            <a:fld id="{ABEBCB03-436C-4D8F-97DD-0E8CF3A00739}" type="slidenum">
-              <a:rPr lang="en-US" smtClean="0"/>
-              <a:t>22</a:t>
-            </a:fld>
-            <a:endParaRPr lang="en-US"/>
-          </a:p>
-        </p:txBody>
-      </p:sp>
-    </p:spTree>
-    <p:extLst>
-      <p:ext uri="{BB962C8B-B14F-4D97-AF65-F5344CB8AC3E}">
         <p14:creationId xmlns:p14="http://schemas.microsoft.com/office/powerpoint/2010/main" val="3935654407"/>
       </p:ext>
     </p:extLst>
@@ -2462,7 +2377,7 @@
           <a:p>
             <a:fld id="{F177A104-0C0B-4348-9A89-F5D228FCF8A6}" type="datetimeFigureOut">
               <a:rPr lang="en-US" smtClean="0"/>
-              <a:t>7/8/2018</a:t>
+              <a:t>7/9/2018</a:t>
             </a:fld>
             <a:endParaRPr lang="en-US"/>
           </a:p>
@@ -2630,7 +2545,7 @@
           <a:p>
             <a:fld id="{F177A104-0C0B-4348-9A89-F5D228FCF8A6}" type="datetimeFigureOut">
               <a:rPr lang="en-US" smtClean="0"/>
-              <a:t>7/8/2018</a:t>
+              <a:t>7/9/2018</a:t>
             </a:fld>
             <a:endParaRPr lang="en-US"/>
           </a:p>
@@ -2808,7 +2723,7 @@
           <a:p>
             <a:fld id="{F177A104-0C0B-4348-9A89-F5D228FCF8A6}" type="datetimeFigureOut">
               <a:rPr lang="en-US" smtClean="0"/>
-              <a:t>7/8/2018</a:t>
+              <a:t>7/9/2018</a:t>
             </a:fld>
             <a:endParaRPr lang="en-US"/>
           </a:p>
@@ -2976,7 +2891,7 @@
           <a:p>
             <a:fld id="{F177A104-0C0B-4348-9A89-F5D228FCF8A6}" type="datetimeFigureOut">
               <a:rPr lang="en-US" smtClean="0"/>
-              <a:t>7/8/2018</a:t>
+              <a:t>7/9/2018</a:t>
             </a:fld>
             <a:endParaRPr lang="en-US"/>
           </a:p>
@@ -3221,7 +3136,7 @@
           <a:p>
             <a:fld id="{F177A104-0C0B-4348-9A89-F5D228FCF8A6}" type="datetimeFigureOut">
               <a:rPr lang="en-US" smtClean="0"/>
-              <a:t>7/8/2018</a:t>
+              <a:t>7/9/2018</a:t>
             </a:fld>
             <a:endParaRPr lang="en-US"/>
           </a:p>
@@ -3450,7 +3365,7 @@
           <a:p>
             <a:fld id="{F177A104-0C0B-4348-9A89-F5D228FCF8A6}" type="datetimeFigureOut">
               <a:rPr lang="en-US" smtClean="0"/>
-              <a:t>7/8/2018</a:t>
+              <a:t>7/9/2018</a:t>
             </a:fld>
             <a:endParaRPr lang="en-US"/>
           </a:p>
@@ -3814,7 +3729,7 @@
           <a:p>
             <a:fld id="{F177A104-0C0B-4348-9A89-F5D228FCF8A6}" type="datetimeFigureOut">
               <a:rPr lang="en-US" smtClean="0"/>
-              <a:t>7/8/2018</a:t>
+              <a:t>7/9/2018</a:t>
             </a:fld>
             <a:endParaRPr lang="en-US"/>
           </a:p>
@@ -3931,7 +3846,7 @@
           <a:p>
             <a:fld id="{F177A104-0C0B-4348-9A89-F5D228FCF8A6}" type="datetimeFigureOut">
               <a:rPr lang="en-US" smtClean="0"/>
-              <a:t>7/8/2018</a:t>
+              <a:t>7/9/2018</a:t>
             </a:fld>
             <a:endParaRPr lang="en-US"/>
           </a:p>
@@ -4026,7 +3941,7 @@
           <a:p>
             <a:fld id="{F177A104-0C0B-4348-9A89-F5D228FCF8A6}" type="datetimeFigureOut">
               <a:rPr lang="en-US" smtClean="0"/>
-              <a:t>7/8/2018</a:t>
+              <a:t>7/9/2018</a:t>
             </a:fld>
             <a:endParaRPr lang="en-US"/>
           </a:p>
@@ -4301,7 +4216,7 @@
           <a:p>
             <a:fld id="{F177A104-0C0B-4348-9A89-F5D228FCF8A6}" type="datetimeFigureOut">
               <a:rPr lang="en-US" smtClean="0"/>
-              <a:t>7/8/2018</a:t>
+              <a:t>7/9/2018</a:t>
             </a:fld>
             <a:endParaRPr lang="en-US"/>
           </a:p>
@@ -4553,7 +4468,7 @@
           <a:p>
             <a:fld id="{F177A104-0C0B-4348-9A89-F5D228FCF8A6}" type="datetimeFigureOut">
               <a:rPr lang="en-US" smtClean="0"/>
-              <a:t>7/8/2018</a:t>
+              <a:t>7/9/2018</a:t>
             </a:fld>
             <a:endParaRPr lang="en-US"/>
           </a:p>
@@ -4764,7 +4679,7 @@
           <a:p>
             <a:fld id="{F177A104-0C0B-4348-9A89-F5D228FCF8A6}" type="datetimeFigureOut">
               <a:rPr lang="en-US" smtClean="0"/>
-              <a:t>7/8/2018</a:t>
+              <a:t>7/9/2018</a:t>
             </a:fld>
             <a:endParaRPr lang="en-US"/>
           </a:p>
@@ -5318,7 +5233,7 @@
           <a:p>
             <a:r>
               <a:rPr lang="en-US" sz="2400" dirty="0"/>
-              <a:t>Ensure to configure the project to use 64-bit IIS Express</a:t>
+              <a:t>Ensure to configure the project to use 64-bit IIS Express for local debugging</a:t>
             </a:r>
           </a:p>
           <a:p>
@@ -7643,105 +7558,6 @@
 </file>
 
 <file path=ppt/slides/slide21.xml><?xml version="1.0" encoding="utf-8"?>
-<p:sld xmlns:a="http://schemas.openxmlformats.org/drawingml/2006/main" xmlns:r="http://schemas.openxmlformats.org/officeDocument/2006/relationships" xmlns:p="http://schemas.openxmlformats.org/presentationml/2006/main">
-  <p:cSld>
-    <p:spTree>
-      <p:nvGrpSpPr>
-        <p:cNvPr id="1" name=""/>
-        <p:cNvGrpSpPr/>
-        <p:nvPr/>
-      </p:nvGrpSpPr>
-      <p:grpSpPr>
-        <a:xfrm>
-          <a:off x="0" y="0"/>
-          <a:ext cx="0" cy="0"/>
-          <a:chOff x="0" y="0"/>
-          <a:chExt cx="0" cy="0"/>
-        </a:xfrm>
-      </p:grpSpPr>
-      <p:sp>
-        <p:nvSpPr>
-          <p:cNvPr id="2" name="Title 1"/>
-          <p:cNvSpPr>
-            <a:spLocks noGrp="1"/>
-          </p:cNvSpPr>
-          <p:nvPr>
-            <p:ph type="title"/>
-          </p:nvPr>
-        </p:nvSpPr>
-        <p:spPr>
-          <a:xfrm>
-            <a:off x="838200" y="208109"/>
-            <a:ext cx="10515600" cy="503092"/>
-          </a:xfrm>
-        </p:spPr>
-        <p:txBody>
-          <a:bodyPr>
-            <a:normAutofit fontScale="90000"/>
-          </a:bodyPr>
-          <a:lstStyle/>
-          <a:p>
-            <a:r>
-              <a:rPr lang="en-US" sz="3600" dirty="0" err="1"/>
-              <a:t>TNCAnimalLabelWebAPI</a:t>
-            </a:r>
-            <a:r>
-              <a:rPr lang="en-US" sz="3600" dirty="0"/>
-              <a:t> Solution - Postman</a:t>
-            </a:r>
-          </a:p>
-        </p:txBody>
-      </p:sp>
-      <p:pic>
-        <p:nvPicPr>
-          <p:cNvPr id="5" name="Picture 4">
-            <a:extLst>
-              <a:ext uri="{FF2B5EF4-FFF2-40B4-BE49-F238E27FC236}">
-                <a16:creationId xmlns:a16="http://schemas.microsoft.com/office/drawing/2014/main" id="{8964D273-354A-4B2A-A3C8-E704109BB645}"/>
-              </a:ext>
-            </a:extLst>
-          </p:cNvPr>
-          <p:cNvPicPr>
-            <a:picLocks noChangeAspect="1"/>
-          </p:cNvPicPr>
-          <p:nvPr/>
-        </p:nvPicPr>
-        <p:blipFill>
-          <a:blip r:embed="rId3">
-            <a:extLst>
-              <a:ext uri="{28A0092B-C50C-407E-A947-70E740481C1C}">
-                <a14:useLocalDpi xmlns:a14="http://schemas.microsoft.com/office/drawing/2010/main" val="0"/>
-              </a:ext>
-            </a:extLst>
-          </a:blip>
-          <a:stretch>
-            <a:fillRect/>
-          </a:stretch>
-        </p:blipFill>
-        <p:spPr>
-          <a:xfrm>
-            <a:off x="1612669" y="1219086"/>
-            <a:ext cx="8966661" cy="4419827"/>
-          </a:xfrm>
-          <a:prstGeom prst="rect">
-            <a:avLst/>
-          </a:prstGeom>
-        </p:spPr>
-      </p:pic>
-    </p:spTree>
-    <p:extLst>
-      <p:ext uri="{BB962C8B-B14F-4D97-AF65-F5344CB8AC3E}">
-        <p14:creationId xmlns:p14="http://schemas.microsoft.com/office/powerpoint/2010/main" val="2019728563"/>
-      </p:ext>
-    </p:extLst>
-  </p:cSld>
-  <p:clrMapOvr>
-    <a:masterClrMapping/>
-  </p:clrMapOvr>
-</p:sld>
-</file>
-
-<file path=ppt/slides/slide22.xml><?xml version="1.0" encoding="utf-8"?>
 <p:sld xmlns:a="http://schemas.openxmlformats.org/drawingml/2006/main" xmlns:r="http://schemas.openxmlformats.org/officeDocument/2006/relationships" xmlns:p="http://schemas.openxmlformats.org/presentationml/2006/main">
   <p:cSld>
     <p:spTree>

</xml_diff>